<commit_message>
merge master to gh-pages
</commit_message>
<xml_diff>
--- a/TimerLab/bin/Debug/Presentation1.pptx
+++ b/TimerLab/bin/Debug/Presentation1.pptx
@@ -2,10 +2,10 @@
 <file path=ppt/presentation.xml><?xml version="1.0" encoding="utf-8"?>
 <p:presentation xmlns:a="http://schemas.openxmlformats.org/drawingml/2006/main" xmlns:r="http://schemas.openxmlformats.org/officeDocument/2006/relationships" xmlns:p="http://schemas.openxmlformats.org/presentationml/2006/main" saveSubsetFonts="1">
   <p:sldMasterIdLst>
-    <p:sldMasterId id="2147483648" r:id="Rbdf4335135964125"/>
+    <p:sldMasterId id="2147483648" r:id="R7d6c183e34ae4f4c"/>
   </p:sldMasterIdLst>
   <p:sldIdLst>
-    <p:sldId id="256" r:id="Ra7a0a51ed8f040d9"/>
+    <p:sldId id="256" r:id="Rfdda336d31224a45"/>
   </p:sldIdLst>
   <p:sldSz cx="12192000" cy="6858000"/>
   <p:notesSz cx="6858000" cy="9144000"/>
@@ -2652,17 +2652,17 @@
   </p:cSld>
   <p:clrMap bg1="lt1" tx1="dk1" bg2="lt2" tx2="dk2" accent1="accent1" accent2="accent2" accent3="accent3" accent4="accent4" accent5="accent5" accent6="accent6" hlink="hlink" folHlink="folHlink"/>
   <p:sldLayoutIdLst>
-    <p:sldLayoutId id="2147483649" r:id="R16499a0ded7e4bfc"/>
-    <p:sldLayoutId id="2147483650" r:id="Ra52c3c8c66ab4859"/>
-    <p:sldLayoutId id="2147483651" r:id="Rf0752ac77a1f4932"/>
-    <p:sldLayoutId id="2147483652" r:id="R8716b286ae6244e1"/>
-    <p:sldLayoutId id="2147483653" r:id="R18137abe393c4f96"/>
-    <p:sldLayoutId id="2147483654" r:id="R643af8433e9947a4"/>
-    <p:sldLayoutId id="2147483655" r:id="Rc87aa109f7f74311"/>
-    <p:sldLayoutId id="2147483656" r:id="Redaddb625a514b7f"/>
-    <p:sldLayoutId id="2147483657" r:id="R70feac8ef5894c73"/>
-    <p:sldLayoutId id="2147483658" r:id="R8d32960c478c42c4"/>
-    <p:sldLayoutId id="2147483659" r:id="Ra90f9409a0cc4c89"/>
+    <p:sldLayoutId id="2147483649" r:id="R3d1cd8726b28459d"/>
+    <p:sldLayoutId id="2147483650" r:id="R10b85bf1398b412e"/>
+    <p:sldLayoutId id="2147483651" r:id="R3a7faa6061db4530"/>
+    <p:sldLayoutId id="2147483652" r:id="Rb2c08af546fd4e63"/>
+    <p:sldLayoutId id="2147483653" r:id="R0b83602172e94716"/>
+    <p:sldLayoutId id="2147483654" r:id="R2cd4ad9fc81d47c9"/>
+    <p:sldLayoutId id="2147483655" r:id="R645762aa0b224361"/>
+    <p:sldLayoutId id="2147483656" r:id="R028663f4806a4a4d"/>
+    <p:sldLayoutId id="2147483657" r:id="R474c4655659a4e9e"/>
+    <p:sldLayoutId id="2147483658" r:id="R1e9b4ec551d44cd4"/>
+    <p:sldLayoutId id="2147483659" r:id="R01f6822dc36c4287"/>
   </p:sldLayoutIdLst>
   <p:txStyles>
     <p:titleStyle>
@@ -3279,7 +3279,7 @@
             </p:xfrm>
             <a:graphic>
               <a:graphicData uri="http://schemas.microsoft.com/office/webextensions/webextension/2010/11">
-                <we:webextensionref xmlns:we="http://schemas.microsoft.com/office/webextensions/webextension/2010/11" xmlns:r="http://schemas.openxmlformats.org/officeDocument/2006/relationships" r:id="Reb0b4195af5f4239"/>
+                <we:webextensionref xmlns:we="http://schemas.microsoft.com/office/webextensions/webextension/2010/11" xmlns:r="http://schemas.openxmlformats.org/officeDocument/2006/relationships" r:id="R7f7765d09c0046b5"/>
               </a:graphicData>
             </a:graphic>
           </p:graphicFrame>
@@ -3291,7 +3291,7 @@
               <p:cNvPicPr/>
             </p:nvPicPr>
             <p:blipFill>
-              <a:blip xmlns:r="http://schemas.openxmlformats.org/officeDocument/2006/relationships" r:embed="R4a10c6102c1f4a23"/>
+              <a:blip xmlns:r="http://schemas.openxmlformats.org/officeDocument/2006/relationships" r:embed="Rbd1b41f1a3394c7e"/>
               <a:stretch>
                 <a:fillRect/>
               </a:stretch>
@@ -3322,11 +3322,11 @@
 </file>
 
 <file path=ppt/slides/udata/data.xml><?xml version="1.0" encoding="utf-8"?>
-<we:webextension xmlns:r="http://schemas.openxmlformats.org/officeDocument/2006/relationships" xmlns:we="http://schemas.microsoft.com/office/webextensions/webextension/2010/11" id="{8b3c77f4-6d9a-4951-a353-5cb68863d90f}">
+<we:webextension xmlns:r="http://schemas.openxmlformats.org/officeDocument/2006/relationships" xmlns:we="http://schemas.microsoft.com/office/webextensions/webextension/2010/11" id="{9ae3eac1-dbf9-47c7-a5ea-169582f1ea60}">
   <we:reference id="48209efd-fa6a-487e-819d-6997ee62111d" version="1.0.0.0" store="developer" storeType="Registry"/>
   <we:alternateReferences/>
   <we:properties/>
   <we:bindings/>
-  <we:snapshot xmlns:r="http://schemas.openxmlformats.org/officeDocument/2006/relationships" r:embed="R4a10c6102c1f4a23"/>
+  <we:snapshot xmlns:r="http://schemas.openxmlformats.org/officeDocument/2006/relationships" r:embed="Rbd1b41f1a3394c7e"/>
 </we:webextension>
 </file>
</xml_diff>